<commit_message>
feat: finalized end results (lesson-10)
</commit_message>
<xml_diff>
--- a/client/lesson-10/lesson-10-react.pptx
+++ b/client/lesson-10/lesson-10-react.pptx
@@ -5,7 +5,7 @@
     <p:sldMasterId id="2147483717" r:id="rId4"/>
   </p:sldMasterIdLst>
   <p:notesMasterIdLst>
-    <p:notesMasterId r:id="rId25"/>
+    <p:notesMasterId r:id="rId26"/>
   </p:notesMasterIdLst>
   <p:sldIdLst>
     <p:sldId id="256" r:id="rId5"/>
@@ -27,7 +27,8 @@
     <p:sldId id="272" r:id="rId21"/>
     <p:sldId id="273" r:id="rId22"/>
     <p:sldId id="274" r:id="rId23"/>
-    <p:sldId id="299" r:id="rId24"/>
+    <p:sldId id="300" r:id="rId24"/>
+    <p:sldId id="299" r:id="rId25"/>
   </p:sldIdLst>
   <p:sldSz cx="12192000" cy="6858000"/>
   <p:notesSz cx="6858000" cy="9144000"/>
@@ -856,7 +857,7 @@
           <a:p>
             <a:fld id="{126DA449-81D0-4C65-80FA-E84926361CC3}" type="datetimeFigureOut">
               <a:rPr lang="en-US" smtClean="0"/>
-              <a:t>4/20/2022</a:t>
+              <a:t>4/26/2022</a:t>
             </a:fld>
             <a:endParaRPr lang="en-US"/>
           </a:p>
@@ -27390,7 +27391,7 @@
                 </a:solidFill>
                 <a:latin typeface="Consolas" panose="020B0609020204030204" pitchFamily="49" charset="0"/>
               </a:rPr>
-              <a:t>npx create-react-app netflixroulette --template @chakra-ui/typescriptó</a:t>
+              <a:t>npx create-react-app netflixroulette --template @chakra-ui/typescript</a:t>
             </a:r>
             <a:endParaRPr lang="en-US" sz="1200" dirty="0">
               <a:solidFill>
@@ -38300,6 +38301,242 @@
 </file>
 
 <file path=ppt/slides/slide20.xml><?xml version="1.0" encoding="utf-8"?>
+<p:sld xmlns:a="http://schemas.openxmlformats.org/drawingml/2006/main" xmlns:r="http://schemas.openxmlformats.org/officeDocument/2006/relationships" xmlns:p="http://schemas.openxmlformats.org/presentationml/2006/main">
+  <p:cSld>
+    <p:spTree>
+      <p:nvGrpSpPr>
+        <p:cNvPr id="1" name=""/>
+        <p:cNvGrpSpPr/>
+        <p:nvPr/>
+      </p:nvGrpSpPr>
+      <p:grpSpPr>
+        <a:xfrm>
+          <a:off x="0" y="0"/>
+          <a:ext cx="0" cy="0"/>
+          <a:chOff x="0" y="0"/>
+          <a:chExt cx="0" cy="0"/>
+        </a:xfrm>
+      </p:grpSpPr>
+      <p:sp>
+        <p:nvSpPr>
+          <p:cNvPr id="3" name="Title 2">
+            <a:extLst>
+              <a:ext uri="{FF2B5EF4-FFF2-40B4-BE49-F238E27FC236}">
+                <a16:creationId xmlns:a16="http://schemas.microsoft.com/office/drawing/2014/main" id="{B1C51107-ADD3-43B9-866B-D7242D50FD1B}"/>
+              </a:ext>
+            </a:extLst>
+          </p:cNvPr>
+          <p:cNvSpPr>
+            <a:spLocks noGrp="1"/>
+          </p:cNvSpPr>
+          <p:nvPr>
+            <p:ph type="title"/>
+          </p:nvPr>
+        </p:nvSpPr>
+        <p:spPr/>
+        <p:txBody>
+          <a:bodyPr/>
+          <a:lstStyle/>
+          <a:p>
+            <a:r>
+              <a:rPr lang="hu-HU" dirty="0"/>
+              <a:t>Differences in final solution</a:t>
+            </a:r>
+            <a:endParaRPr lang="en-US" dirty="0"/>
+          </a:p>
+        </p:txBody>
+      </p:sp>
+      <p:sp>
+        <p:nvSpPr>
+          <p:cNvPr id="2" name="Text Placeholder 1">
+            <a:extLst>
+              <a:ext uri="{FF2B5EF4-FFF2-40B4-BE49-F238E27FC236}">
+                <a16:creationId xmlns:a16="http://schemas.microsoft.com/office/drawing/2014/main" id="{B20A9095-7C7C-4F25-97A2-B7E1D8E4DE40}"/>
+              </a:ext>
+            </a:extLst>
+          </p:cNvPr>
+          <p:cNvSpPr>
+            <a:spLocks noGrp="1"/>
+          </p:cNvSpPr>
+          <p:nvPr>
+            <p:ph type="body" sz="quarter" idx="15"/>
+          </p:nvPr>
+        </p:nvSpPr>
+        <p:spPr/>
+        <p:txBody>
+          <a:bodyPr/>
+          <a:lstStyle/>
+          <a:p>
+            <a:r>
+              <a:rPr lang="hu-HU" dirty="0"/>
+              <a:t>Exercises</a:t>
+            </a:r>
+            <a:endParaRPr lang="en-US" dirty="0"/>
+          </a:p>
+        </p:txBody>
+      </p:sp>
+      <p:sp>
+        <p:nvSpPr>
+          <p:cNvPr id="4" name="TextBox 3">
+            <a:extLst>
+              <a:ext uri="{FF2B5EF4-FFF2-40B4-BE49-F238E27FC236}">
+                <a16:creationId xmlns:a16="http://schemas.microsoft.com/office/drawing/2014/main" id="{5FBA0E80-D2A0-4017-8DC8-4ECD7FA1E94E}"/>
+              </a:ext>
+            </a:extLst>
+          </p:cNvPr>
+          <p:cNvSpPr txBox="1"/>
+          <p:nvPr/>
+        </p:nvSpPr>
+        <p:spPr>
+          <a:xfrm>
+            <a:off x="457199" y="1028700"/>
+            <a:ext cx="11274552" cy="3323987"/>
+          </a:xfrm>
+          <a:prstGeom prst="rect">
+            <a:avLst/>
+          </a:prstGeom>
+        </p:spPr>
+        <p:txBody>
+          <a:bodyPr wrap="square" lIns="0" tIns="0" rIns="0" bIns="0" rtlCol="0">
+            <a:spAutoFit/>
+          </a:bodyPr>
+          <a:lstStyle/>
+          <a:p>
+            <a:pPr marL="285750" indent="-285750">
+              <a:buFont typeface="Arial" panose="020B0604020202020204" pitchFamily="34" charset="0"/>
+              <a:buChar char="•"/>
+            </a:pPr>
+            <a:r>
+              <a:rPr lang="hu-HU" dirty="0"/>
+              <a:t>The theme overrides and ChakraProvider moved to index.tsx from App.tsx</a:t>
+            </a:r>
+          </a:p>
+          <a:p>
+            <a:pPr marL="285750" indent="-285750">
+              <a:buFont typeface="Arial" panose="020B0604020202020204" pitchFamily="34" charset="0"/>
+              <a:buChar char="•"/>
+            </a:pPr>
+            <a:r>
+              <a:rPr lang="hu-HU" dirty="0"/>
+              <a:t>Different styling solution in components: see src/theme/components directory</a:t>
+            </a:r>
+          </a:p>
+          <a:p>
+            <a:pPr marL="742950" lvl="1" indent="-285750">
+              <a:buFont typeface="Arial" panose="020B0604020202020204" pitchFamily="34" charset="0"/>
+              <a:buChar char="•"/>
+            </a:pPr>
+            <a:r>
+              <a:rPr lang="hu-HU" dirty="0"/>
+              <a:t>The components has their own styles collected into one space</a:t>
+            </a:r>
+          </a:p>
+          <a:p>
+            <a:pPr marL="742950" lvl="1" indent="-285750">
+              <a:buFont typeface="Arial" panose="020B0604020202020204" pitchFamily="34" charset="0"/>
+              <a:buChar char="•"/>
+            </a:pPr>
+            <a:r>
+              <a:rPr lang="hu-HU" dirty="0"/>
+              <a:t>You can also define additional styles for your components and use it with useMultiStyleConfig hook</a:t>
+            </a:r>
+          </a:p>
+          <a:p>
+            <a:pPr marL="742950" lvl="1" indent="-285750">
+              <a:buFont typeface="Arial" panose="020B0604020202020204" pitchFamily="34" charset="0"/>
+              <a:buChar char="•"/>
+            </a:pPr>
+            <a:r>
+              <a:rPr lang="hu-HU" dirty="0"/>
+              <a:t>Examples: MovieDescription, MovieListItem</a:t>
+            </a:r>
+          </a:p>
+          <a:p>
+            <a:pPr marL="285750" indent="-285750">
+              <a:buFont typeface="Arial" panose="020B0604020202020204" pitchFamily="34" charset="0"/>
+              <a:buChar char="•"/>
+            </a:pPr>
+            <a:r>
+              <a:rPr lang="hu-HU" dirty="0"/>
+              <a:t>Some new items are introduced, e.g.:</a:t>
+            </a:r>
+          </a:p>
+          <a:p>
+            <a:pPr marL="742950" lvl="1" indent="-285750">
+              <a:buFont typeface="Arial" panose="020B0604020202020204" pitchFamily="34" charset="0"/>
+              <a:buChar char="•"/>
+            </a:pPr>
+            <a:r>
+              <a:rPr lang="hu-HU" dirty="0"/>
+              <a:t>PageHeader – search bar and add movie button, together with the logo</a:t>
+            </a:r>
+          </a:p>
+          <a:p>
+            <a:pPr marL="742950" lvl="1" indent="-285750">
+              <a:buFont typeface="Arial" panose="020B0604020202020204" pitchFamily="34" charset="0"/>
+              <a:buChar char="•"/>
+            </a:pPr>
+            <a:r>
+              <a:rPr lang="hu-HU" dirty="0"/>
+              <a:t>MoviePage – to display a specific movie, will be used in the next lesson</a:t>
+            </a:r>
+          </a:p>
+          <a:p>
+            <a:pPr marL="742950" lvl="1" indent="-285750">
+              <a:buFont typeface="Arial" panose="020B0604020202020204" pitchFamily="34" charset="0"/>
+              <a:buChar char="•"/>
+            </a:pPr>
+            <a:r>
+              <a:rPr lang="hu-HU" dirty="0"/>
+              <a:t>GenreList – display some highlighted genres</a:t>
+            </a:r>
+          </a:p>
+          <a:p>
+            <a:pPr marL="285750" indent="-285750">
+              <a:buFont typeface="Arial" panose="020B0604020202020204" pitchFamily="34" charset="0"/>
+              <a:buChar char="•"/>
+            </a:pPr>
+            <a:r>
+              <a:rPr lang="hu-HU" dirty="0"/>
+              <a:t>New item introduced to handle common layout for each page – NetflixRoulettePage (see: App.tsx)</a:t>
+            </a:r>
+          </a:p>
+          <a:p>
+            <a:pPr marL="742950" lvl="1" indent="-285750">
+              <a:buFont typeface="Arial" panose="020B0604020202020204" pitchFamily="34" charset="0"/>
+              <a:buChar char="•"/>
+            </a:pPr>
+            <a:r>
+              <a:rPr lang="hu-HU" dirty="0"/>
+              <a:t>functional component that already includes the page footer and organizes the other items</a:t>
+            </a:r>
+          </a:p>
+          <a:p>
+            <a:pPr marL="742950" lvl="1" indent="-285750">
+              <a:buFont typeface="Arial" panose="020B0604020202020204" pitchFamily="34" charset="0"/>
+              <a:buChar char="•"/>
+            </a:pPr>
+            <a:r>
+              <a:rPr lang="hu-HU" dirty="0"/>
+              <a:t>content is defined by its children – replace PageHeader component with MoviePage to see the results in App.tsx</a:t>
+            </a:r>
+          </a:p>
+        </p:txBody>
+      </p:sp>
+    </p:spTree>
+    <p:extLst>
+      <p:ext uri="{BB962C8B-B14F-4D97-AF65-F5344CB8AC3E}">
+        <p14:creationId xmlns:p14="http://schemas.microsoft.com/office/powerpoint/2010/main" val="4292118540"/>
+      </p:ext>
+    </p:extLst>
+  </p:cSld>
+  <p:clrMapOvr>
+    <a:masterClrMapping/>
+  </p:clrMapOvr>
+</p:sld>
+</file>
+
+<file path=ppt/slides/slide21.xml><?xml version="1.0" encoding="utf-8"?>
 <p:sld xmlns:a="http://schemas.openxmlformats.org/drawingml/2006/main" xmlns:r="http://schemas.openxmlformats.org/officeDocument/2006/relationships" xmlns:p="http://schemas.openxmlformats.org/presentationml/2006/main">
   <p:cSld>
     <p:spTree>
@@ -42972,18 +43209,18 @@
 </file>
 
 <file path=customXml/item1.xml><?xml version="1.0" encoding="utf-8"?>
+<p:properties xmlns:p="http://schemas.microsoft.com/office/2006/metadata/properties" xmlns:xsi="http://www.w3.org/2001/XMLSchema-instance" xmlns:pc="http://schemas.microsoft.com/office/infopath/2007/PartnerControls">
+  <documentManagement/>
+</p:properties>
+</file>
+
+<file path=customXml/item2.xml><?xml version="1.0" encoding="utf-8"?>
 <?mso-contentType ?>
 <FormTemplates xmlns="http://schemas.microsoft.com/sharepoint/v3/contenttype/forms">
   <Display>DocumentLibraryForm</Display>
   <Edit>DocumentLibraryForm</Edit>
   <New>DocumentLibraryForm</New>
 </FormTemplates>
-</file>
-
-<file path=customXml/item2.xml><?xml version="1.0" encoding="utf-8"?>
-<p:properties xmlns:p="http://schemas.microsoft.com/office/2006/metadata/properties" xmlns:xsi="http://www.w3.org/2001/XMLSchema-instance" xmlns:pc="http://schemas.microsoft.com/office/infopath/2007/PartnerControls">
-  <documentManagement/>
-</p:properties>
 </file>
 
 <file path=customXml/item3.xml><?xml version="1.0" encoding="utf-8"?>
@@ -43204,18 +43441,18 @@
 </file>
 
 <file path=customXml/itemProps1.xml><?xml version="1.0" encoding="utf-8"?>
-<ds:datastoreItem xmlns:ds="http://schemas.openxmlformats.org/officeDocument/2006/customXml" ds:itemID="{87CA341C-74C1-4577-8C96-EF2605DC526A}">
+<ds:datastoreItem xmlns:ds="http://schemas.openxmlformats.org/officeDocument/2006/customXml" ds:itemID="{412E3419-B313-4514-AD24-D56E1F80A63A}">
   <ds:schemaRefs>
-    <ds:schemaRef ds:uri="http://schemas.microsoft.com/sharepoint/v3/contenttype/forms"/>
+    <ds:schemaRef ds:uri="http://schemas.microsoft.com/office/2006/metadata/properties"/>
+    <ds:schemaRef ds:uri="http://schemas.microsoft.com/office/infopath/2007/PartnerControls"/>
   </ds:schemaRefs>
 </ds:datastoreItem>
 </file>
 
 <file path=customXml/itemProps2.xml><?xml version="1.0" encoding="utf-8"?>
-<ds:datastoreItem xmlns:ds="http://schemas.openxmlformats.org/officeDocument/2006/customXml" ds:itemID="{412E3419-B313-4514-AD24-D56E1F80A63A}">
+<ds:datastoreItem xmlns:ds="http://schemas.openxmlformats.org/officeDocument/2006/customXml" ds:itemID="{87CA341C-74C1-4577-8C96-EF2605DC526A}">
   <ds:schemaRefs>
-    <ds:schemaRef ds:uri="http://schemas.microsoft.com/office/2006/metadata/properties"/>
-    <ds:schemaRef ds:uri="http://schemas.microsoft.com/office/infopath/2007/PartnerControls"/>
+    <ds:schemaRef ds:uri="http://schemas.microsoft.com/sharepoint/v3/contenttype/forms"/>
   </ds:schemaRefs>
 </ds:datastoreItem>
 </file>

</xml_diff>